<commit_message>
Added potential zoomed in planet design
</commit_message>
<xml_diff>
--- a/planet-design.pptx
+++ b/planet-design.pptx
@@ -7,10 +7,11 @@
   <p:sldIdLst>
     <p:sldId id="256" r:id="rId2"/>
     <p:sldId id="257" r:id="rId3"/>
-    <p:sldId id="258" r:id="rId4"/>
-    <p:sldId id="259" r:id="rId5"/>
-    <p:sldId id="260" r:id="rId6"/>
-    <p:sldId id="261" r:id="rId7"/>
+    <p:sldId id="262" r:id="rId4"/>
+    <p:sldId id="258" r:id="rId5"/>
+    <p:sldId id="259" r:id="rId6"/>
+    <p:sldId id="260" r:id="rId7"/>
+    <p:sldId id="261" r:id="rId8"/>
   </p:sldIdLst>
   <p:sldSz cx="12192000" cy="6858000"/>
   <p:notesSz cx="6858000" cy="9144000"/>
@@ -1789,7 +1790,7 @@
           <a:p>
             <a:fld id="{826E4767-E5ED-4AC9-AD32-CF0160A4E153}" type="datetimeFigureOut">
               <a:rPr lang="en-US" smtClean="0"/>
-              <a:t>3/27/2020</a:t>
+              <a:t>5/9/2020</a:t>
             </a:fld>
             <a:endParaRPr lang="en-US"/>
           </a:p>
@@ -1989,7 +1990,7 @@
           <a:p>
             <a:fld id="{826E4767-E5ED-4AC9-AD32-CF0160A4E153}" type="datetimeFigureOut">
               <a:rPr lang="en-US" smtClean="0"/>
-              <a:t>3/27/2020</a:t>
+              <a:t>5/9/2020</a:t>
             </a:fld>
             <a:endParaRPr lang="en-US"/>
           </a:p>
@@ -2199,7 +2200,7 @@
           <a:p>
             <a:fld id="{826E4767-E5ED-4AC9-AD32-CF0160A4E153}" type="datetimeFigureOut">
               <a:rPr lang="en-US" smtClean="0"/>
-              <a:t>3/27/2020</a:t>
+              <a:t>5/9/2020</a:t>
             </a:fld>
             <a:endParaRPr lang="en-US"/>
           </a:p>
@@ -2399,7 +2400,7 @@
           <a:p>
             <a:fld id="{826E4767-E5ED-4AC9-AD32-CF0160A4E153}" type="datetimeFigureOut">
               <a:rPr lang="en-US" smtClean="0"/>
-              <a:t>3/27/2020</a:t>
+              <a:t>5/9/2020</a:t>
             </a:fld>
             <a:endParaRPr lang="en-US"/>
           </a:p>
@@ -2675,7 +2676,7 @@
           <a:p>
             <a:fld id="{826E4767-E5ED-4AC9-AD32-CF0160A4E153}" type="datetimeFigureOut">
               <a:rPr lang="en-US" smtClean="0"/>
-              <a:t>3/27/2020</a:t>
+              <a:t>5/9/2020</a:t>
             </a:fld>
             <a:endParaRPr lang="en-US"/>
           </a:p>
@@ -2943,7 +2944,7 @@
           <a:p>
             <a:fld id="{826E4767-E5ED-4AC9-AD32-CF0160A4E153}" type="datetimeFigureOut">
               <a:rPr lang="en-US" smtClean="0"/>
-              <a:t>3/27/2020</a:t>
+              <a:t>5/9/2020</a:t>
             </a:fld>
             <a:endParaRPr lang="en-US"/>
           </a:p>
@@ -3358,7 +3359,7 @@
           <a:p>
             <a:fld id="{826E4767-E5ED-4AC9-AD32-CF0160A4E153}" type="datetimeFigureOut">
               <a:rPr lang="en-US" smtClean="0"/>
-              <a:t>3/27/2020</a:t>
+              <a:t>5/9/2020</a:t>
             </a:fld>
             <a:endParaRPr lang="en-US"/>
           </a:p>
@@ -3500,7 +3501,7 @@
           <a:p>
             <a:fld id="{826E4767-E5ED-4AC9-AD32-CF0160A4E153}" type="datetimeFigureOut">
               <a:rPr lang="en-US" smtClean="0"/>
-              <a:t>3/27/2020</a:t>
+              <a:t>5/9/2020</a:t>
             </a:fld>
             <a:endParaRPr lang="en-US"/>
           </a:p>
@@ -3613,7 +3614,7 @@
           <a:p>
             <a:fld id="{826E4767-E5ED-4AC9-AD32-CF0160A4E153}" type="datetimeFigureOut">
               <a:rPr lang="en-US" smtClean="0"/>
-              <a:t>3/27/2020</a:t>
+              <a:t>5/9/2020</a:t>
             </a:fld>
             <a:endParaRPr lang="en-US"/>
           </a:p>
@@ -3926,7 +3927,7 @@
           <a:p>
             <a:fld id="{826E4767-E5ED-4AC9-AD32-CF0160A4E153}" type="datetimeFigureOut">
               <a:rPr lang="en-US" smtClean="0"/>
-              <a:t>3/27/2020</a:t>
+              <a:t>5/9/2020</a:t>
             </a:fld>
             <a:endParaRPr lang="en-US"/>
           </a:p>
@@ -4215,7 +4216,7 @@
           <a:p>
             <a:fld id="{826E4767-E5ED-4AC9-AD32-CF0160A4E153}" type="datetimeFigureOut">
               <a:rPr lang="en-US" smtClean="0"/>
-              <a:t>3/27/2020</a:t>
+              <a:t>5/9/2020</a:t>
             </a:fld>
             <a:endParaRPr lang="en-US"/>
           </a:p>
@@ -4458,7 +4459,7 @@
           <a:p>
             <a:fld id="{826E4767-E5ED-4AC9-AD32-CF0160A4E153}" type="datetimeFigureOut">
               <a:rPr lang="en-US" smtClean="0"/>
-              <a:t>3/27/2020</a:t>
+              <a:t>5/9/2020</a:t>
             </a:fld>
             <a:endParaRPr lang="en-US"/>
           </a:p>
@@ -6691,6 +6692,1455 @@
       </p:grpSpPr>
       <p:grpSp>
         <p:nvGrpSpPr>
+          <p:cNvPr id="3" name="Grupp 2">
+            <a:extLst>
+              <a:ext uri="{FF2B5EF4-FFF2-40B4-BE49-F238E27FC236}">
+                <a16:creationId xmlns:a16="http://schemas.microsoft.com/office/drawing/2014/main" id="{B7F00569-38E9-456A-A08A-153C3A1B4AD2}"/>
+              </a:ext>
+            </a:extLst>
+          </p:cNvPr>
+          <p:cNvGrpSpPr/>
+          <p:nvPr/>
+        </p:nvGrpSpPr>
+        <p:grpSpPr>
+          <a:xfrm>
+            <a:off x="6053796" y="1005278"/>
+            <a:ext cx="1958092" cy="2056063"/>
+            <a:chOff x="1150868" y="45720"/>
+            <a:chExt cx="1958092" cy="2056063"/>
+          </a:xfrm>
+        </p:grpSpPr>
+        <p:sp>
+          <p:nvSpPr>
+            <p:cNvPr id="9" name="Rektangel 8">
+              <a:extLst>
+                <a:ext uri="{FF2B5EF4-FFF2-40B4-BE49-F238E27FC236}">
+                  <a16:creationId xmlns:a16="http://schemas.microsoft.com/office/drawing/2014/main" id="{3E832F21-D0B4-46C9-A2CC-CDFB0426329A}"/>
+                </a:ext>
+              </a:extLst>
+            </p:cNvPr>
+            <p:cNvSpPr/>
+            <p:nvPr/>
+          </p:nvSpPr>
+          <p:spPr>
+            <a:xfrm>
+              <a:off x="1150868" y="228600"/>
+              <a:ext cx="1958092" cy="391886"/>
+            </a:xfrm>
+            <a:prstGeom prst="rect">
+              <a:avLst/>
+            </a:prstGeom>
+            <a:solidFill>
+              <a:schemeClr val="accent2"/>
+            </a:solidFill>
+            <a:ln>
+              <a:noFill/>
+            </a:ln>
+          </p:spPr>
+          <p:style>
+            <a:lnRef idx="2">
+              <a:schemeClr val="accent1">
+                <a:shade val="50000"/>
+              </a:schemeClr>
+            </a:lnRef>
+            <a:fillRef idx="1">
+              <a:schemeClr val="accent1"/>
+            </a:fillRef>
+            <a:effectRef idx="0">
+              <a:schemeClr val="accent1"/>
+            </a:effectRef>
+            <a:fontRef idx="minor">
+              <a:schemeClr val="lt1"/>
+            </a:fontRef>
+          </p:style>
+          <p:txBody>
+            <a:bodyPr rtlCol="0" anchor="ctr"/>
+            <a:lstStyle/>
+            <a:p>
+              <a:pPr algn="ctr"/>
+              <a:endParaRPr lang="en-US"/>
+            </a:p>
+          </p:txBody>
+        </p:sp>
+        <p:sp>
+          <p:nvSpPr>
+            <p:cNvPr id="10" name="Rektangel 9">
+              <a:extLst>
+                <a:ext uri="{FF2B5EF4-FFF2-40B4-BE49-F238E27FC236}">
+                  <a16:creationId xmlns:a16="http://schemas.microsoft.com/office/drawing/2014/main" id="{11C6E5CF-60C4-4340-9AEF-E9F9D0F59034}"/>
+                </a:ext>
+              </a:extLst>
+            </p:cNvPr>
+            <p:cNvSpPr/>
+            <p:nvPr/>
+          </p:nvSpPr>
+          <p:spPr>
+            <a:xfrm>
+              <a:off x="1150868" y="620486"/>
+              <a:ext cx="1958092" cy="169817"/>
+            </a:xfrm>
+            <a:prstGeom prst="rect">
+              <a:avLst/>
+            </a:prstGeom>
+            <a:solidFill>
+              <a:schemeClr val="accent2">
+                <a:lumMod val="60000"/>
+                <a:lumOff val="40000"/>
+              </a:schemeClr>
+            </a:solidFill>
+            <a:ln>
+              <a:noFill/>
+            </a:ln>
+          </p:spPr>
+          <p:style>
+            <a:lnRef idx="2">
+              <a:schemeClr val="accent1">
+                <a:shade val="50000"/>
+              </a:schemeClr>
+            </a:lnRef>
+            <a:fillRef idx="1">
+              <a:schemeClr val="accent1"/>
+            </a:fillRef>
+            <a:effectRef idx="0">
+              <a:schemeClr val="accent1"/>
+            </a:effectRef>
+            <a:fontRef idx="minor">
+              <a:schemeClr val="lt1"/>
+            </a:fontRef>
+          </p:style>
+          <p:txBody>
+            <a:bodyPr rtlCol="0" anchor="ctr"/>
+            <a:lstStyle/>
+            <a:p>
+              <a:pPr algn="ctr"/>
+              <a:endParaRPr lang="en-US"/>
+            </a:p>
+          </p:txBody>
+        </p:sp>
+        <p:sp>
+          <p:nvSpPr>
+            <p:cNvPr id="11" name="Rektangel 10">
+              <a:extLst>
+                <a:ext uri="{FF2B5EF4-FFF2-40B4-BE49-F238E27FC236}">
+                  <a16:creationId xmlns:a16="http://schemas.microsoft.com/office/drawing/2014/main" id="{67C8DADE-D744-4B7F-BEC8-111DA9779344}"/>
+                </a:ext>
+              </a:extLst>
+            </p:cNvPr>
+            <p:cNvSpPr/>
+            <p:nvPr/>
+          </p:nvSpPr>
+          <p:spPr>
+            <a:xfrm>
+              <a:off x="1150868" y="744583"/>
+              <a:ext cx="1958092" cy="241663"/>
+            </a:xfrm>
+            <a:prstGeom prst="rect">
+              <a:avLst/>
+            </a:prstGeom>
+            <a:solidFill>
+              <a:schemeClr val="accent2">
+                <a:lumMod val="50000"/>
+              </a:schemeClr>
+            </a:solidFill>
+            <a:ln>
+              <a:noFill/>
+            </a:ln>
+          </p:spPr>
+          <p:style>
+            <a:lnRef idx="2">
+              <a:schemeClr val="accent1">
+                <a:shade val="50000"/>
+              </a:schemeClr>
+            </a:lnRef>
+            <a:fillRef idx="1">
+              <a:schemeClr val="accent1"/>
+            </a:fillRef>
+            <a:effectRef idx="0">
+              <a:schemeClr val="accent1"/>
+            </a:effectRef>
+            <a:fontRef idx="minor">
+              <a:schemeClr val="lt1"/>
+            </a:fontRef>
+          </p:style>
+          <p:txBody>
+            <a:bodyPr rtlCol="0" anchor="ctr"/>
+            <a:lstStyle/>
+            <a:p>
+              <a:pPr algn="ctr"/>
+              <a:endParaRPr lang="en-US"/>
+            </a:p>
+          </p:txBody>
+        </p:sp>
+        <p:sp>
+          <p:nvSpPr>
+            <p:cNvPr id="12" name="Rektangel 11">
+              <a:extLst>
+                <a:ext uri="{FF2B5EF4-FFF2-40B4-BE49-F238E27FC236}">
+                  <a16:creationId xmlns:a16="http://schemas.microsoft.com/office/drawing/2014/main" id="{664C2D47-0C36-4C77-B3C0-2AEDC2455A05}"/>
+                </a:ext>
+              </a:extLst>
+            </p:cNvPr>
+            <p:cNvSpPr/>
+            <p:nvPr/>
+          </p:nvSpPr>
+          <p:spPr>
+            <a:xfrm>
+              <a:off x="1150868" y="986245"/>
+              <a:ext cx="1958092" cy="336961"/>
+            </a:xfrm>
+            <a:prstGeom prst="rect">
+              <a:avLst/>
+            </a:prstGeom>
+            <a:solidFill>
+              <a:schemeClr val="accent2">
+                <a:lumMod val="75000"/>
+              </a:schemeClr>
+            </a:solidFill>
+            <a:ln>
+              <a:noFill/>
+            </a:ln>
+          </p:spPr>
+          <p:style>
+            <a:lnRef idx="2">
+              <a:schemeClr val="accent1">
+                <a:shade val="50000"/>
+              </a:schemeClr>
+            </a:lnRef>
+            <a:fillRef idx="1">
+              <a:schemeClr val="accent1"/>
+            </a:fillRef>
+            <a:effectRef idx="0">
+              <a:schemeClr val="accent1"/>
+            </a:effectRef>
+            <a:fontRef idx="minor">
+              <a:schemeClr val="lt1"/>
+            </a:fontRef>
+          </p:style>
+          <p:txBody>
+            <a:bodyPr rtlCol="0" anchor="ctr"/>
+            <a:lstStyle/>
+            <a:p>
+              <a:pPr algn="ctr"/>
+              <a:endParaRPr lang="en-US"/>
+            </a:p>
+          </p:txBody>
+        </p:sp>
+        <p:sp>
+          <p:nvSpPr>
+            <p:cNvPr id="13" name="Rektangel 12">
+              <a:extLst>
+                <a:ext uri="{FF2B5EF4-FFF2-40B4-BE49-F238E27FC236}">
+                  <a16:creationId xmlns:a16="http://schemas.microsoft.com/office/drawing/2014/main" id="{3063D62D-5179-4AE9-8708-268CBA21866B}"/>
+                </a:ext>
+              </a:extLst>
+            </p:cNvPr>
+            <p:cNvSpPr/>
+            <p:nvPr/>
+          </p:nvSpPr>
+          <p:spPr>
+            <a:xfrm>
+              <a:off x="1150868" y="1300934"/>
+              <a:ext cx="1958092" cy="391886"/>
+            </a:xfrm>
+            <a:prstGeom prst="rect">
+              <a:avLst/>
+            </a:prstGeom>
+            <a:solidFill>
+              <a:schemeClr val="accent2"/>
+            </a:solidFill>
+            <a:ln>
+              <a:noFill/>
+            </a:ln>
+          </p:spPr>
+          <p:style>
+            <a:lnRef idx="2">
+              <a:schemeClr val="accent1">
+                <a:shade val="50000"/>
+              </a:schemeClr>
+            </a:lnRef>
+            <a:fillRef idx="1">
+              <a:schemeClr val="accent1"/>
+            </a:fillRef>
+            <a:effectRef idx="0">
+              <a:schemeClr val="accent1"/>
+            </a:effectRef>
+            <a:fontRef idx="minor">
+              <a:schemeClr val="lt1"/>
+            </a:fontRef>
+          </p:style>
+          <p:txBody>
+            <a:bodyPr rtlCol="0" anchor="ctr"/>
+            <a:lstStyle/>
+            <a:p>
+              <a:pPr algn="ctr"/>
+              <a:endParaRPr lang="en-US"/>
+            </a:p>
+          </p:txBody>
+        </p:sp>
+        <p:sp>
+          <p:nvSpPr>
+            <p:cNvPr id="14" name="Rektangel 13">
+              <a:extLst>
+                <a:ext uri="{FF2B5EF4-FFF2-40B4-BE49-F238E27FC236}">
+                  <a16:creationId xmlns:a16="http://schemas.microsoft.com/office/drawing/2014/main" id="{3A24EBE4-ED42-4EAD-BD36-EE70D668DD15}"/>
+                </a:ext>
+              </a:extLst>
+            </p:cNvPr>
+            <p:cNvSpPr/>
+            <p:nvPr/>
+          </p:nvSpPr>
+          <p:spPr>
+            <a:xfrm>
+              <a:off x="1150868" y="1517062"/>
+              <a:ext cx="1958092" cy="241663"/>
+            </a:xfrm>
+            <a:prstGeom prst="rect">
+              <a:avLst/>
+            </a:prstGeom>
+            <a:solidFill>
+              <a:schemeClr val="accent2">
+                <a:lumMod val="50000"/>
+              </a:schemeClr>
+            </a:solidFill>
+            <a:ln>
+              <a:noFill/>
+            </a:ln>
+          </p:spPr>
+          <p:style>
+            <a:lnRef idx="2">
+              <a:schemeClr val="accent1">
+                <a:shade val="50000"/>
+              </a:schemeClr>
+            </a:lnRef>
+            <a:fillRef idx="1">
+              <a:schemeClr val="accent1"/>
+            </a:fillRef>
+            <a:effectRef idx="0">
+              <a:schemeClr val="accent1"/>
+            </a:effectRef>
+            <a:fontRef idx="minor">
+              <a:schemeClr val="lt1"/>
+            </a:fontRef>
+          </p:style>
+          <p:txBody>
+            <a:bodyPr rtlCol="0" anchor="ctr"/>
+            <a:lstStyle/>
+            <a:p>
+              <a:pPr algn="ctr"/>
+              <a:endParaRPr lang="en-US"/>
+            </a:p>
+          </p:txBody>
+        </p:sp>
+        <p:sp>
+          <p:nvSpPr>
+            <p:cNvPr id="15" name="Rektangel 14">
+              <a:extLst>
+                <a:ext uri="{FF2B5EF4-FFF2-40B4-BE49-F238E27FC236}">
+                  <a16:creationId xmlns:a16="http://schemas.microsoft.com/office/drawing/2014/main" id="{4AF614C0-FA06-4BA0-9A49-84B26FE986AD}"/>
+                </a:ext>
+              </a:extLst>
+            </p:cNvPr>
+            <p:cNvSpPr/>
+            <p:nvPr/>
+          </p:nvSpPr>
+          <p:spPr>
+            <a:xfrm>
+              <a:off x="1150868" y="149033"/>
+              <a:ext cx="1958092" cy="241663"/>
+            </a:xfrm>
+            <a:prstGeom prst="rect">
+              <a:avLst/>
+            </a:prstGeom>
+            <a:solidFill>
+              <a:schemeClr val="accent2">
+                <a:lumMod val="20000"/>
+                <a:lumOff val="80000"/>
+              </a:schemeClr>
+            </a:solidFill>
+            <a:ln>
+              <a:noFill/>
+            </a:ln>
+          </p:spPr>
+          <p:style>
+            <a:lnRef idx="2">
+              <a:schemeClr val="accent1">
+                <a:shade val="50000"/>
+              </a:schemeClr>
+            </a:lnRef>
+            <a:fillRef idx="1">
+              <a:schemeClr val="accent1"/>
+            </a:fillRef>
+            <a:effectRef idx="0">
+              <a:schemeClr val="accent1"/>
+            </a:effectRef>
+            <a:fontRef idx="minor">
+              <a:schemeClr val="lt1"/>
+            </a:fontRef>
+          </p:style>
+          <p:txBody>
+            <a:bodyPr rtlCol="0" anchor="ctr"/>
+            <a:lstStyle/>
+            <a:p>
+              <a:pPr algn="ctr"/>
+              <a:endParaRPr lang="en-US"/>
+            </a:p>
+          </p:txBody>
+        </p:sp>
+        <p:sp>
+          <p:nvSpPr>
+            <p:cNvPr id="16" name="Rektangel 15">
+              <a:extLst>
+                <a:ext uri="{FF2B5EF4-FFF2-40B4-BE49-F238E27FC236}">
+                  <a16:creationId xmlns:a16="http://schemas.microsoft.com/office/drawing/2014/main" id="{5836C942-7ED7-4083-A296-DDD8BA0A8BA2}"/>
+                </a:ext>
+              </a:extLst>
+            </p:cNvPr>
+            <p:cNvSpPr/>
+            <p:nvPr/>
+          </p:nvSpPr>
+          <p:spPr>
+            <a:xfrm>
+              <a:off x="1150868" y="45720"/>
+              <a:ext cx="1958092" cy="241663"/>
+            </a:xfrm>
+            <a:prstGeom prst="rect">
+              <a:avLst/>
+            </a:prstGeom>
+            <a:solidFill>
+              <a:schemeClr val="accent2">
+                <a:lumMod val="40000"/>
+                <a:lumOff val="60000"/>
+              </a:schemeClr>
+            </a:solidFill>
+            <a:ln>
+              <a:noFill/>
+            </a:ln>
+          </p:spPr>
+          <p:style>
+            <a:lnRef idx="2">
+              <a:schemeClr val="accent1">
+                <a:shade val="50000"/>
+              </a:schemeClr>
+            </a:lnRef>
+            <a:fillRef idx="1">
+              <a:schemeClr val="accent1"/>
+            </a:fillRef>
+            <a:effectRef idx="0">
+              <a:schemeClr val="accent1"/>
+            </a:effectRef>
+            <a:fontRef idx="minor">
+              <a:schemeClr val="lt1"/>
+            </a:fontRef>
+          </p:style>
+          <p:txBody>
+            <a:bodyPr rtlCol="0" anchor="ctr"/>
+            <a:lstStyle/>
+            <a:p>
+              <a:pPr algn="ctr"/>
+              <a:endParaRPr lang="en-US"/>
+            </a:p>
+          </p:txBody>
+        </p:sp>
+        <p:sp>
+          <p:nvSpPr>
+            <p:cNvPr id="17" name="Rektangel 16">
+              <a:extLst>
+                <a:ext uri="{FF2B5EF4-FFF2-40B4-BE49-F238E27FC236}">
+                  <a16:creationId xmlns:a16="http://schemas.microsoft.com/office/drawing/2014/main" id="{568E2178-CED8-4BA9-89CF-C0398B6655F6}"/>
+                </a:ext>
+              </a:extLst>
+            </p:cNvPr>
+            <p:cNvSpPr/>
+            <p:nvPr/>
+          </p:nvSpPr>
+          <p:spPr>
+            <a:xfrm>
+              <a:off x="1150868" y="1562055"/>
+              <a:ext cx="1958092" cy="539728"/>
+            </a:xfrm>
+            <a:prstGeom prst="rect">
+              <a:avLst/>
+            </a:prstGeom>
+            <a:solidFill>
+              <a:schemeClr val="accent2"/>
+            </a:solidFill>
+            <a:ln>
+              <a:noFill/>
+            </a:ln>
+          </p:spPr>
+          <p:style>
+            <a:lnRef idx="2">
+              <a:schemeClr val="accent1">
+                <a:shade val="50000"/>
+              </a:schemeClr>
+            </a:lnRef>
+            <a:fillRef idx="1">
+              <a:schemeClr val="accent1"/>
+            </a:fillRef>
+            <a:effectRef idx="0">
+              <a:schemeClr val="accent1"/>
+            </a:effectRef>
+            <a:fontRef idx="minor">
+              <a:schemeClr val="lt1"/>
+            </a:fontRef>
+          </p:style>
+          <p:txBody>
+            <a:bodyPr rtlCol="0" anchor="ctr"/>
+            <a:lstStyle/>
+            <a:p>
+              <a:pPr algn="ctr"/>
+              <a:endParaRPr lang="en-US"/>
+            </a:p>
+          </p:txBody>
+        </p:sp>
+        <p:sp>
+          <p:nvSpPr>
+            <p:cNvPr id="18" name="Rektangel 17">
+              <a:extLst>
+                <a:ext uri="{FF2B5EF4-FFF2-40B4-BE49-F238E27FC236}">
+                  <a16:creationId xmlns:a16="http://schemas.microsoft.com/office/drawing/2014/main" id="{8E282DE7-7E61-4F55-9972-DB9E06C8762D}"/>
+                </a:ext>
+              </a:extLst>
+            </p:cNvPr>
+            <p:cNvSpPr/>
+            <p:nvPr/>
+          </p:nvSpPr>
+          <p:spPr>
+            <a:xfrm>
+              <a:off x="1150868" y="1679647"/>
+              <a:ext cx="1958092" cy="239561"/>
+            </a:xfrm>
+            <a:prstGeom prst="rect">
+              <a:avLst/>
+            </a:prstGeom>
+            <a:solidFill>
+              <a:schemeClr val="accent2">
+                <a:lumMod val="60000"/>
+                <a:lumOff val="40000"/>
+              </a:schemeClr>
+            </a:solidFill>
+            <a:ln>
+              <a:noFill/>
+            </a:ln>
+          </p:spPr>
+          <p:style>
+            <a:lnRef idx="2">
+              <a:schemeClr val="accent1">
+                <a:shade val="50000"/>
+              </a:schemeClr>
+            </a:lnRef>
+            <a:fillRef idx="1">
+              <a:schemeClr val="accent1"/>
+            </a:fillRef>
+            <a:effectRef idx="0">
+              <a:schemeClr val="accent1"/>
+            </a:effectRef>
+            <a:fontRef idx="minor">
+              <a:schemeClr val="lt1"/>
+            </a:fontRef>
+          </p:style>
+          <p:txBody>
+            <a:bodyPr rtlCol="0" anchor="ctr"/>
+            <a:lstStyle/>
+            <a:p>
+              <a:pPr algn="ctr"/>
+              <a:endParaRPr lang="en-US"/>
+            </a:p>
+          </p:txBody>
+        </p:sp>
+      </p:grpSp>
+      <p:sp>
+        <p:nvSpPr>
+          <p:cNvPr id="19" name="Ellips 18">
+            <a:extLst>
+              <a:ext uri="{FF2B5EF4-FFF2-40B4-BE49-F238E27FC236}">
+                <a16:creationId xmlns:a16="http://schemas.microsoft.com/office/drawing/2014/main" id="{B3BC491E-F76D-43CA-BFAB-2E4EC3F59F17}"/>
+              </a:ext>
+            </a:extLst>
+          </p:cNvPr>
+          <p:cNvSpPr/>
+          <p:nvPr/>
+        </p:nvSpPr>
+        <p:spPr>
+          <a:xfrm>
+            <a:off x="1134367" y="873722"/>
+            <a:ext cx="4318763" cy="4318763"/>
+          </a:xfrm>
+          <a:prstGeom prst="ellipse">
+            <a:avLst/>
+          </a:prstGeom>
+          <a:blipFill>
+            <a:blip r:embed="rId2"/>
+            <a:stretch>
+              <a:fillRect/>
+            </a:stretch>
+          </a:blipFill>
+          <a:ln>
+            <a:solidFill>
+              <a:schemeClr val="tx1"/>
+            </a:solidFill>
+          </a:ln>
+          <a:effectLst/>
+        </p:spPr>
+        <p:style>
+          <a:lnRef idx="2">
+            <a:schemeClr val="accent1">
+              <a:shade val="50000"/>
+            </a:schemeClr>
+          </a:lnRef>
+          <a:fillRef idx="1">
+            <a:schemeClr val="accent1"/>
+          </a:fillRef>
+          <a:effectRef idx="0">
+            <a:schemeClr val="accent1"/>
+          </a:effectRef>
+          <a:fontRef idx="minor">
+            <a:schemeClr val="lt1"/>
+          </a:fontRef>
+        </p:style>
+        <p:txBody>
+          <a:bodyPr rtlCol="0" anchor="ctr"/>
+          <a:lstStyle/>
+          <a:p>
+            <a:pPr algn="ctr"/>
+            <a:endParaRPr lang="en-US"/>
+          </a:p>
+        </p:txBody>
+      </p:sp>
+      <p:grpSp>
+        <p:nvGrpSpPr>
+          <p:cNvPr id="34" name="Grupp 33">
+            <a:extLst>
+              <a:ext uri="{FF2B5EF4-FFF2-40B4-BE49-F238E27FC236}">
+                <a16:creationId xmlns:a16="http://schemas.microsoft.com/office/drawing/2014/main" id="{26DF6C85-ABCF-49F3-B86A-4ABA7B15E72F}"/>
+              </a:ext>
+            </a:extLst>
+          </p:cNvPr>
+          <p:cNvGrpSpPr/>
+          <p:nvPr/>
+        </p:nvGrpSpPr>
+        <p:grpSpPr>
+          <a:xfrm>
+            <a:off x="6123469" y="3290325"/>
+            <a:ext cx="1377626" cy="715811"/>
+            <a:chOff x="1886833" y="3643354"/>
+            <a:chExt cx="1377626" cy="715811"/>
+          </a:xfrm>
+        </p:grpSpPr>
+        <p:sp>
+          <p:nvSpPr>
+            <p:cNvPr id="7" name="Ellips 6">
+              <a:extLst>
+                <a:ext uri="{FF2B5EF4-FFF2-40B4-BE49-F238E27FC236}">
+                  <a16:creationId xmlns:a16="http://schemas.microsoft.com/office/drawing/2014/main" id="{75DC9150-63A1-4B56-9AD1-FE1ACA14A2E8}"/>
+                </a:ext>
+              </a:extLst>
+            </p:cNvPr>
+            <p:cNvSpPr/>
+            <p:nvPr/>
+          </p:nvSpPr>
+          <p:spPr>
+            <a:xfrm>
+              <a:off x="1886833" y="3643354"/>
+              <a:ext cx="1377626" cy="715811"/>
+            </a:xfrm>
+            <a:prstGeom prst="ellipse">
+              <a:avLst/>
+            </a:prstGeom>
+            <a:solidFill>
+              <a:schemeClr val="accent2">
+                <a:lumMod val="20000"/>
+                <a:lumOff val="80000"/>
+              </a:schemeClr>
+            </a:solidFill>
+            <a:ln w="57150">
+              <a:solidFill>
+                <a:schemeClr val="accent2">
+                  <a:lumMod val="50000"/>
+                </a:schemeClr>
+              </a:solidFill>
+            </a:ln>
+          </p:spPr>
+          <p:style>
+            <a:lnRef idx="2">
+              <a:schemeClr val="accent1">
+                <a:shade val="50000"/>
+              </a:schemeClr>
+            </a:lnRef>
+            <a:fillRef idx="1">
+              <a:schemeClr val="accent1"/>
+            </a:fillRef>
+            <a:effectRef idx="0">
+              <a:schemeClr val="accent1"/>
+            </a:effectRef>
+            <a:fontRef idx="minor">
+              <a:schemeClr val="lt1"/>
+            </a:fontRef>
+          </p:style>
+          <p:txBody>
+            <a:bodyPr rtlCol="0" anchor="ctr"/>
+            <a:lstStyle/>
+            <a:p>
+              <a:pPr algn="ctr"/>
+              <a:endParaRPr lang="en-US"/>
+            </a:p>
+          </p:txBody>
+        </p:sp>
+        <p:sp>
+          <p:nvSpPr>
+            <p:cNvPr id="21" name="Ellips 20">
+              <a:extLst>
+                <a:ext uri="{FF2B5EF4-FFF2-40B4-BE49-F238E27FC236}">
+                  <a16:creationId xmlns:a16="http://schemas.microsoft.com/office/drawing/2014/main" id="{E666EF5A-421D-418D-B556-16CCC444E195}"/>
+                </a:ext>
+              </a:extLst>
+            </p:cNvPr>
+            <p:cNvSpPr/>
+            <p:nvPr/>
+          </p:nvSpPr>
+          <p:spPr>
+            <a:xfrm>
+              <a:off x="2101661" y="3754978"/>
+              <a:ext cx="947969" cy="492562"/>
+            </a:xfrm>
+            <a:prstGeom prst="ellipse">
+              <a:avLst/>
+            </a:prstGeom>
+            <a:solidFill>
+              <a:schemeClr val="accent2">
+                <a:lumMod val="40000"/>
+                <a:lumOff val="60000"/>
+              </a:schemeClr>
+            </a:solidFill>
+            <a:ln w="28575">
+              <a:noFill/>
+            </a:ln>
+          </p:spPr>
+          <p:style>
+            <a:lnRef idx="2">
+              <a:schemeClr val="accent1">
+                <a:shade val="50000"/>
+              </a:schemeClr>
+            </a:lnRef>
+            <a:fillRef idx="1">
+              <a:schemeClr val="accent1"/>
+            </a:fillRef>
+            <a:effectRef idx="0">
+              <a:schemeClr val="accent1"/>
+            </a:effectRef>
+            <a:fontRef idx="minor">
+              <a:schemeClr val="lt1"/>
+            </a:fontRef>
+          </p:style>
+          <p:txBody>
+            <a:bodyPr rtlCol="0" anchor="ctr"/>
+            <a:lstStyle/>
+            <a:p>
+              <a:pPr algn="ctr"/>
+              <a:endParaRPr lang="en-US"/>
+            </a:p>
+          </p:txBody>
+        </p:sp>
+        <p:sp>
+          <p:nvSpPr>
+            <p:cNvPr id="22" name="Ellips 21">
+              <a:extLst>
+                <a:ext uri="{FF2B5EF4-FFF2-40B4-BE49-F238E27FC236}">
+                  <a16:creationId xmlns:a16="http://schemas.microsoft.com/office/drawing/2014/main" id="{353944ED-7947-4F0D-BF13-A93C85DAC3E1}"/>
+                </a:ext>
+              </a:extLst>
+            </p:cNvPr>
+            <p:cNvSpPr/>
+            <p:nvPr/>
+          </p:nvSpPr>
+          <p:spPr>
+            <a:xfrm>
+              <a:off x="2275501" y="3845304"/>
+              <a:ext cx="600291" cy="311910"/>
+            </a:xfrm>
+            <a:prstGeom prst="ellipse">
+              <a:avLst/>
+            </a:prstGeom>
+            <a:solidFill>
+              <a:srgbClr val="ED7D31"/>
+            </a:solidFill>
+            <a:ln w="28575">
+              <a:noFill/>
+            </a:ln>
+          </p:spPr>
+          <p:style>
+            <a:lnRef idx="2">
+              <a:schemeClr val="accent1">
+                <a:shade val="50000"/>
+              </a:schemeClr>
+            </a:lnRef>
+            <a:fillRef idx="1">
+              <a:schemeClr val="accent1"/>
+            </a:fillRef>
+            <a:effectRef idx="0">
+              <a:schemeClr val="accent1"/>
+            </a:effectRef>
+            <a:fontRef idx="minor">
+              <a:schemeClr val="lt1"/>
+            </a:fontRef>
+          </p:style>
+          <p:txBody>
+            <a:bodyPr rtlCol="0" anchor="ctr"/>
+            <a:lstStyle/>
+            <a:p>
+              <a:pPr algn="ctr"/>
+              <a:endParaRPr lang="en-US"/>
+            </a:p>
+          </p:txBody>
+        </p:sp>
+      </p:grpSp>
+      <p:grpSp>
+        <p:nvGrpSpPr>
+          <p:cNvPr id="33" name="Grupp 32">
+            <a:extLst>
+              <a:ext uri="{FF2B5EF4-FFF2-40B4-BE49-F238E27FC236}">
+                <a16:creationId xmlns:a16="http://schemas.microsoft.com/office/drawing/2014/main" id="{5DD096C2-4DCC-462C-857D-01B64CED7CF9}"/>
+              </a:ext>
+            </a:extLst>
+          </p:cNvPr>
+          <p:cNvGrpSpPr/>
+          <p:nvPr/>
+        </p:nvGrpSpPr>
+        <p:grpSpPr>
+          <a:xfrm>
+            <a:off x="1794804" y="3744148"/>
+            <a:ext cx="1254868" cy="523976"/>
+            <a:chOff x="6843214" y="4461783"/>
+            <a:chExt cx="1765597" cy="737234"/>
+          </a:xfrm>
+        </p:grpSpPr>
+        <p:sp>
+          <p:nvSpPr>
+            <p:cNvPr id="30" name="Frihandsfigur: Form 29">
+              <a:extLst>
+                <a:ext uri="{FF2B5EF4-FFF2-40B4-BE49-F238E27FC236}">
+                  <a16:creationId xmlns:a16="http://schemas.microsoft.com/office/drawing/2014/main" id="{C74BADCC-F65A-49B8-8DAA-43556C07E6E1}"/>
+                </a:ext>
+              </a:extLst>
+            </p:cNvPr>
+            <p:cNvSpPr/>
+            <p:nvPr/>
+          </p:nvSpPr>
+          <p:spPr>
+            <a:xfrm>
+              <a:off x="6843214" y="4461783"/>
+              <a:ext cx="1765597" cy="737234"/>
+            </a:xfrm>
+            <a:custGeom>
+              <a:avLst/>
+              <a:gdLst>
+                <a:gd name="connsiteX0" fmla="*/ 882798 w 1765597"/>
+                <a:gd name="connsiteY0" fmla="*/ 0 h 737234"/>
+                <a:gd name="connsiteX1" fmla="*/ 1743679 w 1765597"/>
+                <a:gd name="connsiteY1" fmla="*/ 338554 h 737234"/>
+                <a:gd name="connsiteX2" fmla="*/ 1765597 w 1765597"/>
+                <a:gd name="connsiteY2" fmla="*/ 368617 h 737234"/>
+                <a:gd name="connsiteX3" fmla="*/ 1743679 w 1765597"/>
+                <a:gd name="connsiteY3" fmla="*/ 398681 h 737234"/>
+                <a:gd name="connsiteX4" fmla="*/ 882798 w 1765597"/>
+                <a:gd name="connsiteY4" fmla="*/ 737234 h 737234"/>
+                <a:gd name="connsiteX5" fmla="*/ 21918 w 1765597"/>
+                <a:gd name="connsiteY5" fmla="*/ 398681 h 737234"/>
+                <a:gd name="connsiteX6" fmla="*/ 0 w 1765597"/>
+                <a:gd name="connsiteY6" fmla="*/ 368617 h 737234"/>
+                <a:gd name="connsiteX7" fmla="*/ 21918 w 1765597"/>
+                <a:gd name="connsiteY7" fmla="*/ 338554 h 737234"/>
+                <a:gd name="connsiteX8" fmla="*/ 882798 w 1765597"/>
+                <a:gd name="connsiteY8" fmla="*/ 0 h 737234"/>
+              </a:gdLst>
+              <a:ahLst/>
+              <a:cxnLst>
+                <a:cxn ang="0">
+                  <a:pos x="connsiteX0" y="connsiteY0"/>
+                </a:cxn>
+                <a:cxn ang="0">
+                  <a:pos x="connsiteX1" y="connsiteY1"/>
+                </a:cxn>
+                <a:cxn ang="0">
+                  <a:pos x="connsiteX2" y="connsiteY2"/>
+                </a:cxn>
+                <a:cxn ang="0">
+                  <a:pos x="connsiteX3" y="connsiteY3"/>
+                </a:cxn>
+                <a:cxn ang="0">
+                  <a:pos x="connsiteX4" y="connsiteY4"/>
+                </a:cxn>
+                <a:cxn ang="0">
+                  <a:pos x="connsiteX5" y="connsiteY5"/>
+                </a:cxn>
+                <a:cxn ang="0">
+                  <a:pos x="connsiteX6" y="connsiteY6"/>
+                </a:cxn>
+                <a:cxn ang="0">
+                  <a:pos x="connsiteX7" y="connsiteY7"/>
+                </a:cxn>
+                <a:cxn ang="0">
+                  <a:pos x="connsiteX8" y="connsiteY8"/>
+                </a:cxn>
+              </a:cxnLst>
+              <a:rect l="l" t="t" r="r" b="b"/>
+              <a:pathLst>
+                <a:path w="1765597" h="737234">
+                  <a:moveTo>
+                    <a:pt x="882798" y="0"/>
+                  </a:moveTo>
+                  <a:cubicBezTo>
+                    <a:pt x="1254538" y="0"/>
+                    <a:pt x="1577888" y="136896"/>
+                    <a:pt x="1743679" y="338554"/>
+                  </a:cubicBezTo>
+                  <a:lnTo>
+                    <a:pt x="1765597" y="368617"/>
+                  </a:lnTo>
+                  <a:lnTo>
+                    <a:pt x="1743679" y="398681"/>
+                  </a:lnTo>
+                  <a:cubicBezTo>
+                    <a:pt x="1577888" y="600338"/>
+                    <a:pt x="1254538" y="737234"/>
+                    <a:pt x="882798" y="737234"/>
+                  </a:cubicBezTo>
+                  <a:cubicBezTo>
+                    <a:pt x="511059" y="737234"/>
+                    <a:pt x="187709" y="600338"/>
+                    <a:pt x="21918" y="398681"/>
+                  </a:cubicBezTo>
+                  <a:lnTo>
+                    <a:pt x="0" y="368617"/>
+                  </a:lnTo>
+                  <a:lnTo>
+                    <a:pt x="21918" y="338554"/>
+                  </a:lnTo>
+                  <a:cubicBezTo>
+                    <a:pt x="187709" y="136896"/>
+                    <a:pt x="511059" y="0"/>
+                    <a:pt x="882798" y="0"/>
+                  </a:cubicBezTo>
+                  <a:close/>
+                </a:path>
+              </a:pathLst>
+            </a:custGeom>
+            <a:solidFill>
+              <a:schemeClr val="accent2">
+                <a:lumMod val="20000"/>
+                <a:lumOff val="80000"/>
+              </a:schemeClr>
+            </a:solidFill>
+            <a:ln w="57150">
+              <a:solidFill>
+                <a:schemeClr val="accent2">
+                  <a:lumMod val="50000"/>
+                </a:schemeClr>
+              </a:solidFill>
+            </a:ln>
+          </p:spPr>
+          <p:style>
+            <a:lnRef idx="2">
+              <a:schemeClr val="accent1">
+                <a:shade val="50000"/>
+              </a:schemeClr>
+            </a:lnRef>
+            <a:fillRef idx="1">
+              <a:schemeClr val="accent1"/>
+            </a:fillRef>
+            <a:effectRef idx="0">
+              <a:schemeClr val="accent1"/>
+            </a:effectRef>
+            <a:fontRef idx="minor">
+              <a:schemeClr val="lt1"/>
+            </a:fontRef>
+          </p:style>
+          <p:txBody>
+            <a:bodyPr rtlCol="0" anchor="ctr"/>
+            <a:lstStyle/>
+            <a:p>
+              <a:pPr algn="ctr"/>
+              <a:endParaRPr lang="en-US"/>
+            </a:p>
+          </p:txBody>
+        </p:sp>
+        <p:sp>
+          <p:nvSpPr>
+            <p:cNvPr id="31" name="Frihandsfigur: Form 30">
+              <a:extLst>
+                <a:ext uri="{FF2B5EF4-FFF2-40B4-BE49-F238E27FC236}">
+                  <a16:creationId xmlns:a16="http://schemas.microsoft.com/office/drawing/2014/main" id="{EC741A12-FFC5-44D8-BF8C-BD73AC3C9F7D}"/>
+                </a:ext>
+              </a:extLst>
+            </p:cNvPr>
+            <p:cNvSpPr/>
+            <p:nvPr/>
+          </p:nvSpPr>
+          <p:spPr>
+            <a:xfrm>
+              <a:off x="7157110" y="4592852"/>
+              <a:ext cx="1137804" cy="475096"/>
+            </a:xfrm>
+            <a:custGeom>
+              <a:avLst/>
+              <a:gdLst>
+                <a:gd name="connsiteX0" fmla="*/ 882798 w 1765597"/>
+                <a:gd name="connsiteY0" fmla="*/ 0 h 737234"/>
+                <a:gd name="connsiteX1" fmla="*/ 1743679 w 1765597"/>
+                <a:gd name="connsiteY1" fmla="*/ 338554 h 737234"/>
+                <a:gd name="connsiteX2" fmla="*/ 1765597 w 1765597"/>
+                <a:gd name="connsiteY2" fmla="*/ 368617 h 737234"/>
+                <a:gd name="connsiteX3" fmla="*/ 1743679 w 1765597"/>
+                <a:gd name="connsiteY3" fmla="*/ 398681 h 737234"/>
+                <a:gd name="connsiteX4" fmla="*/ 882798 w 1765597"/>
+                <a:gd name="connsiteY4" fmla="*/ 737234 h 737234"/>
+                <a:gd name="connsiteX5" fmla="*/ 21918 w 1765597"/>
+                <a:gd name="connsiteY5" fmla="*/ 398681 h 737234"/>
+                <a:gd name="connsiteX6" fmla="*/ 0 w 1765597"/>
+                <a:gd name="connsiteY6" fmla="*/ 368617 h 737234"/>
+                <a:gd name="connsiteX7" fmla="*/ 21918 w 1765597"/>
+                <a:gd name="connsiteY7" fmla="*/ 338554 h 737234"/>
+                <a:gd name="connsiteX8" fmla="*/ 882798 w 1765597"/>
+                <a:gd name="connsiteY8" fmla="*/ 0 h 737234"/>
+              </a:gdLst>
+              <a:ahLst/>
+              <a:cxnLst>
+                <a:cxn ang="0">
+                  <a:pos x="connsiteX0" y="connsiteY0"/>
+                </a:cxn>
+                <a:cxn ang="0">
+                  <a:pos x="connsiteX1" y="connsiteY1"/>
+                </a:cxn>
+                <a:cxn ang="0">
+                  <a:pos x="connsiteX2" y="connsiteY2"/>
+                </a:cxn>
+                <a:cxn ang="0">
+                  <a:pos x="connsiteX3" y="connsiteY3"/>
+                </a:cxn>
+                <a:cxn ang="0">
+                  <a:pos x="connsiteX4" y="connsiteY4"/>
+                </a:cxn>
+                <a:cxn ang="0">
+                  <a:pos x="connsiteX5" y="connsiteY5"/>
+                </a:cxn>
+                <a:cxn ang="0">
+                  <a:pos x="connsiteX6" y="connsiteY6"/>
+                </a:cxn>
+                <a:cxn ang="0">
+                  <a:pos x="connsiteX7" y="connsiteY7"/>
+                </a:cxn>
+                <a:cxn ang="0">
+                  <a:pos x="connsiteX8" y="connsiteY8"/>
+                </a:cxn>
+              </a:cxnLst>
+              <a:rect l="l" t="t" r="r" b="b"/>
+              <a:pathLst>
+                <a:path w="1765597" h="737234">
+                  <a:moveTo>
+                    <a:pt x="882798" y="0"/>
+                  </a:moveTo>
+                  <a:cubicBezTo>
+                    <a:pt x="1254538" y="0"/>
+                    <a:pt x="1577888" y="136896"/>
+                    <a:pt x="1743679" y="338554"/>
+                  </a:cubicBezTo>
+                  <a:lnTo>
+                    <a:pt x="1765597" y="368617"/>
+                  </a:lnTo>
+                  <a:lnTo>
+                    <a:pt x="1743679" y="398681"/>
+                  </a:lnTo>
+                  <a:cubicBezTo>
+                    <a:pt x="1577888" y="600338"/>
+                    <a:pt x="1254538" y="737234"/>
+                    <a:pt x="882798" y="737234"/>
+                  </a:cubicBezTo>
+                  <a:cubicBezTo>
+                    <a:pt x="511059" y="737234"/>
+                    <a:pt x="187709" y="600338"/>
+                    <a:pt x="21918" y="398681"/>
+                  </a:cubicBezTo>
+                  <a:lnTo>
+                    <a:pt x="0" y="368617"/>
+                  </a:lnTo>
+                  <a:lnTo>
+                    <a:pt x="21918" y="338554"/>
+                  </a:lnTo>
+                  <a:cubicBezTo>
+                    <a:pt x="187709" y="136896"/>
+                    <a:pt x="511059" y="0"/>
+                    <a:pt x="882798" y="0"/>
+                  </a:cubicBezTo>
+                  <a:close/>
+                </a:path>
+              </a:pathLst>
+            </a:custGeom>
+            <a:solidFill>
+              <a:schemeClr val="accent2">
+                <a:lumMod val="40000"/>
+                <a:lumOff val="60000"/>
+              </a:schemeClr>
+            </a:solidFill>
+            <a:ln w="57150">
+              <a:noFill/>
+            </a:ln>
+          </p:spPr>
+          <p:style>
+            <a:lnRef idx="2">
+              <a:schemeClr val="accent1">
+                <a:shade val="50000"/>
+              </a:schemeClr>
+            </a:lnRef>
+            <a:fillRef idx="1">
+              <a:schemeClr val="accent1"/>
+            </a:fillRef>
+            <a:effectRef idx="0">
+              <a:schemeClr val="accent1"/>
+            </a:effectRef>
+            <a:fontRef idx="minor">
+              <a:schemeClr val="lt1"/>
+            </a:fontRef>
+          </p:style>
+          <p:txBody>
+            <a:bodyPr rtlCol="0" anchor="ctr"/>
+            <a:lstStyle/>
+            <a:p>
+              <a:pPr algn="ctr"/>
+              <a:endParaRPr lang="en-US"/>
+            </a:p>
+          </p:txBody>
+        </p:sp>
+        <p:sp>
+          <p:nvSpPr>
+            <p:cNvPr id="32" name="Frihandsfigur: Form 31">
+              <a:extLst>
+                <a:ext uri="{FF2B5EF4-FFF2-40B4-BE49-F238E27FC236}">
+                  <a16:creationId xmlns:a16="http://schemas.microsoft.com/office/drawing/2014/main" id="{56E89B3F-80D6-48B5-A926-0CB3FBBE0491}"/>
+                </a:ext>
+              </a:extLst>
+            </p:cNvPr>
+            <p:cNvSpPr/>
+            <p:nvPr/>
+          </p:nvSpPr>
+          <p:spPr>
+            <a:xfrm>
+              <a:off x="7394490" y="4691971"/>
+              <a:ext cx="663044" cy="276858"/>
+            </a:xfrm>
+            <a:custGeom>
+              <a:avLst/>
+              <a:gdLst>
+                <a:gd name="connsiteX0" fmla="*/ 882798 w 1765597"/>
+                <a:gd name="connsiteY0" fmla="*/ 0 h 737234"/>
+                <a:gd name="connsiteX1" fmla="*/ 1743679 w 1765597"/>
+                <a:gd name="connsiteY1" fmla="*/ 338554 h 737234"/>
+                <a:gd name="connsiteX2" fmla="*/ 1765597 w 1765597"/>
+                <a:gd name="connsiteY2" fmla="*/ 368617 h 737234"/>
+                <a:gd name="connsiteX3" fmla="*/ 1743679 w 1765597"/>
+                <a:gd name="connsiteY3" fmla="*/ 398681 h 737234"/>
+                <a:gd name="connsiteX4" fmla="*/ 882798 w 1765597"/>
+                <a:gd name="connsiteY4" fmla="*/ 737234 h 737234"/>
+                <a:gd name="connsiteX5" fmla="*/ 21918 w 1765597"/>
+                <a:gd name="connsiteY5" fmla="*/ 398681 h 737234"/>
+                <a:gd name="connsiteX6" fmla="*/ 0 w 1765597"/>
+                <a:gd name="connsiteY6" fmla="*/ 368617 h 737234"/>
+                <a:gd name="connsiteX7" fmla="*/ 21918 w 1765597"/>
+                <a:gd name="connsiteY7" fmla="*/ 338554 h 737234"/>
+                <a:gd name="connsiteX8" fmla="*/ 882798 w 1765597"/>
+                <a:gd name="connsiteY8" fmla="*/ 0 h 737234"/>
+              </a:gdLst>
+              <a:ahLst/>
+              <a:cxnLst>
+                <a:cxn ang="0">
+                  <a:pos x="connsiteX0" y="connsiteY0"/>
+                </a:cxn>
+                <a:cxn ang="0">
+                  <a:pos x="connsiteX1" y="connsiteY1"/>
+                </a:cxn>
+                <a:cxn ang="0">
+                  <a:pos x="connsiteX2" y="connsiteY2"/>
+                </a:cxn>
+                <a:cxn ang="0">
+                  <a:pos x="connsiteX3" y="connsiteY3"/>
+                </a:cxn>
+                <a:cxn ang="0">
+                  <a:pos x="connsiteX4" y="connsiteY4"/>
+                </a:cxn>
+                <a:cxn ang="0">
+                  <a:pos x="connsiteX5" y="connsiteY5"/>
+                </a:cxn>
+                <a:cxn ang="0">
+                  <a:pos x="connsiteX6" y="connsiteY6"/>
+                </a:cxn>
+                <a:cxn ang="0">
+                  <a:pos x="connsiteX7" y="connsiteY7"/>
+                </a:cxn>
+                <a:cxn ang="0">
+                  <a:pos x="connsiteX8" y="connsiteY8"/>
+                </a:cxn>
+              </a:cxnLst>
+              <a:rect l="l" t="t" r="r" b="b"/>
+              <a:pathLst>
+                <a:path w="1765597" h="737234">
+                  <a:moveTo>
+                    <a:pt x="882798" y="0"/>
+                  </a:moveTo>
+                  <a:cubicBezTo>
+                    <a:pt x="1254538" y="0"/>
+                    <a:pt x="1577888" y="136896"/>
+                    <a:pt x="1743679" y="338554"/>
+                  </a:cubicBezTo>
+                  <a:lnTo>
+                    <a:pt x="1765597" y="368617"/>
+                  </a:lnTo>
+                  <a:lnTo>
+                    <a:pt x="1743679" y="398681"/>
+                  </a:lnTo>
+                  <a:cubicBezTo>
+                    <a:pt x="1577888" y="600338"/>
+                    <a:pt x="1254538" y="737234"/>
+                    <a:pt x="882798" y="737234"/>
+                  </a:cubicBezTo>
+                  <a:cubicBezTo>
+                    <a:pt x="511059" y="737234"/>
+                    <a:pt x="187709" y="600338"/>
+                    <a:pt x="21918" y="398681"/>
+                  </a:cubicBezTo>
+                  <a:lnTo>
+                    <a:pt x="0" y="368617"/>
+                  </a:lnTo>
+                  <a:lnTo>
+                    <a:pt x="21918" y="338554"/>
+                  </a:lnTo>
+                  <a:cubicBezTo>
+                    <a:pt x="187709" y="136896"/>
+                    <a:pt x="511059" y="0"/>
+                    <a:pt x="882798" y="0"/>
+                  </a:cubicBezTo>
+                  <a:close/>
+                </a:path>
+              </a:pathLst>
+            </a:custGeom>
+            <a:solidFill>
+              <a:schemeClr val="accent2">
+                <a:lumMod val="60000"/>
+                <a:lumOff val="40000"/>
+              </a:schemeClr>
+            </a:solidFill>
+            <a:ln w="57150">
+              <a:noFill/>
+            </a:ln>
+          </p:spPr>
+          <p:style>
+            <a:lnRef idx="2">
+              <a:schemeClr val="accent1">
+                <a:shade val="50000"/>
+              </a:schemeClr>
+            </a:lnRef>
+            <a:fillRef idx="1">
+              <a:schemeClr val="accent1"/>
+            </a:fillRef>
+            <a:effectRef idx="0">
+              <a:schemeClr val="accent1"/>
+            </a:effectRef>
+            <a:fontRef idx="minor">
+              <a:schemeClr val="lt1"/>
+            </a:fontRef>
+          </p:style>
+          <p:txBody>
+            <a:bodyPr rtlCol="0" anchor="ctr"/>
+            <a:lstStyle/>
+            <a:p>
+              <a:pPr algn="ctr"/>
+              <a:endParaRPr lang="en-US"/>
+            </a:p>
+          </p:txBody>
+        </p:sp>
+      </p:grpSp>
+      <p:pic>
+        <p:nvPicPr>
+          <p:cNvPr id="35" name="Bildobjekt 34">
+            <a:extLst>
+              <a:ext uri="{FF2B5EF4-FFF2-40B4-BE49-F238E27FC236}">
+                <a16:creationId xmlns:a16="http://schemas.microsoft.com/office/drawing/2014/main" id="{C8D2E4A3-0FB7-42EC-B05E-58FCBD467AAE}"/>
+              </a:ext>
+            </a:extLst>
+          </p:cNvPr>
+          <p:cNvPicPr>
+            <a:picLocks noChangeAspect="1"/>
+          </p:cNvPicPr>
+          <p:nvPr/>
+        </p:nvPicPr>
+        <p:blipFill>
+          <a:blip r:embed="rId3">
+            <a:extLst>
+              <a:ext uri="{28A0092B-C50C-407E-A947-70E740481C1C}">
+                <a14:useLocalDpi xmlns:a14="http://schemas.microsoft.com/office/drawing/2010/main" val="0"/>
+              </a:ext>
+            </a:extLst>
+          </a:blip>
+          <a:stretch>
+            <a:fillRect/>
+          </a:stretch>
+        </p:blipFill>
+        <p:spPr>
+          <a:xfrm>
+            <a:off x="8702427" y="3290325"/>
+            <a:ext cx="3054531" cy="3054531"/>
+          </a:xfrm>
+          <a:prstGeom prst="rect">
+            <a:avLst/>
+          </a:prstGeom>
+        </p:spPr>
+      </p:pic>
+      <p:sp>
+        <p:nvSpPr>
+          <p:cNvPr id="26" name="Frihandsfigur: Form 25">
+            <a:extLst>
+              <a:ext uri="{FF2B5EF4-FFF2-40B4-BE49-F238E27FC236}">
+                <a16:creationId xmlns:a16="http://schemas.microsoft.com/office/drawing/2014/main" id="{232C27D0-7EEA-4D10-B7D0-E5142E54436C}"/>
+              </a:ext>
+            </a:extLst>
+          </p:cNvPr>
+          <p:cNvSpPr/>
+          <p:nvPr/>
+        </p:nvSpPr>
+        <p:spPr>
+          <a:xfrm>
+            <a:off x="861069" y="5500067"/>
+            <a:ext cx="7474991" cy="968422"/>
+          </a:xfrm>
+          <a:custGeom>
+            <a:avLst/>
+            <a:gdLst>
+              <a:gd name="connsiteX0" fmla="*/ 3737495 w 7474991"/>
+              <a:gd name="connsiteY0" fmla="*/ 0 h 968422"/>
+              <a:gd name="connsiteX1" fmla="*/ 7332819 w 7474991"/>
+              <a:gd name="connsiteY1" fmla="*/ 851045 h 968422"/>
+              <a:gd name="connsiteX2" fmla="*/ 7474991 w 7474991"/>
+              <a:gd name="connsiteY2" fmla="*/ 968422 h 968422"/>
+              <a:gd name="connsiteX3" fmla="*/ 0 w 7474991"/>
+              <a:gd name="connsiteY3" fmla="*/ 968422 h 968422"/>
+              <a:gd name="connsiteX4" fmla="*/ 142171 w 7474991"/>
+              <a:gd name="connsiteY4" fmla="*/ 851045 h 968422"/>
+              <a:gd name="connsiteX5" fmla="*/ 3737495 w 7474991"/>
+              <a:gd name="connsiteY5" fmla="*/ 0 h 968422"/>
+            </a:gdLst>
+            <a:ahLst/>
+            <a:cxnLst>
+              <a:cxn ang="0">
+                <a:pos x="connsiteX0" y="connsiteY0"/>
+              </a:cxn>
+              <a:cxn ang="0">
+                <a:pos x="connsiteX1" y="connsiteY1"/>
+              </a:cxn>
+              <a:cxn ang="0">
+                <a:pos x="connsiteX2" y="connsiteY2"/>
+              </a:cxn>
+              <a:cxn ang="0">
+                <a:pos x="connsiteX3" y="connsiteY3"/>
+              </a:cxn>
+              <a:cxn ang="0">
+                <a:pos x="connsiteX4" y="connsiteY4"/>
+              </a:cxn>
+              <a:cxn ang="0">
+                <a:pos x="connsiteX5" y="connsiteY5"/>
+              </a:cxn>
+            </a:cxnLst>
+            <a:rect l="l" t="t" r="r" b="b"/>
+            <a:pathLst>
+              <a:path w="7474991" h="968422">
+                <a:moveTo>
+                  <a:pt x="3737495" y="0"/>
+                </a:moveTo>
+                <a:cubicBezTo>
+                  <a:pt x="5290004" y="0"/>
+                  <a:pt x="6640421" y="344125"/>
+                  <a:pt x="7332819" y="851045"/>
+                </a:cubicBezTo>
+                <a:lnTo>
+                  <a:pt x="7474991" y="968422"/>
+                </a:lnTo>
+                <a:lnTo>
+                  <a:pt x="0" y="968422"/>
+                </a:lnTo>
+                <a:lnTo>
+                  <a:pt x="142171" y="851045"/>
+                </a:lnTo>
+                <a:cubicBezTo>
+                  <a:pt x="834569" y="344125"/>
+                  <a:pt x="2184986" y="0"/>
+                  <a:pt x="3737495" y="0"/>
+                </a:cubicBezTo>
+                <a:close/>
+              </a:path>
+            </a:pathLst>
+          </a:custGeom>
+          <a:blipFill dpi="0" rotWithShape="1">
+            <a:blip r:embed="rId4"/>
+            <a:srcRect/>
+            <a:tile tx="0" ty="0" sx="100000" sy="100000" flip="none" algn="tl"/>
+          </a:blipFill>
+        </p:spPr>
+        <p:style>
+          <a:lnRef idx="2">
+            <a:schemeClr val="accent1">
+              <a:shade val="50000"/>
+            </a:schemeClr>
+          </a:lnRef>
+          <a:fillRef idx="1">
+            <a:schemeClr val="accent1"/>
+          </a:fillRef>
+          <a:effectRef idx="0">
+            <a:schemeClr val="accent1"/>
+          </a:effectRef>
+          <a:fontRef idx="minor">
+            <a:schemeClr val="lt1"/>
+          </a:fontRef>
+        </p:style>
+        <p:txBody>
+          <a:bodyPr wrap="square" rtlCol="0" anchor="ctr">
+            <a:noAutofit/>
+          </a:bodyPr>
+          <a:lstStyle/>
+          <a:p>
+            <a:pPr algn="ctr"/>
+            <a:endParaRPr lang="en-US"/>
+          </a:p>
+        </p:txBody>
+      </p:sp>
+    </p:spTree>
+    <p:extLst>
+      <p:ext uri="{BB962C8B-B14F-4D97-AF65-F5344CB8AC3E}">
+        <p14:creationId xmlns:p14="http://schemas.microsoft.com/office/powerpoint/2010/main" val="2357771855"/>
+      </p:ext>
+    </p:extLst>
+  </p:cSld>
+  <p:clrMapOvr>
+    <a:masterClrMapping/>
+  </p:clrMapOvr>
+</p:sld>
+</file>
+
+<file path=ppt/slides/slide4.xml><?xml version="1.0" encoding="utf-8"?>
+<p:sld xmlns:a="http://schemas.openxmlformats.org/drawingml/2006/main" xmlns:r="http://schemas.openxmlformats.org/officeDocument/2006/relationships" xmlns:p="http://schemas.openxmlformats.org/presentationml/2006/main">
+  <p:cSld>
+    <p:spTree>
+      <p:nvGrpSpPr>
+        <p:cNvPr id="1" name=""/>
+        <p:cNvGrpSpPr/>
+        <p:nvPr/>
+      </p:nvGrpSpPr>
+      <p:grpSpPr>
+        <a:xfrm>
+          <a:off x="0" y="0"/>
+          <a:ext cx="0" cy="0"/>
+          <a:chOff x="0" y="0"/>
+          <a:chExt cx="0" cy="0"/>
+        </a:xfrm>
+      </p:grpSpPr>
+      <p:grpSp>
+        <p:nvGrpSpPr>
           <p:cNvPr id="5" name="Grupp 4">
             <a:extLst>
               <a:ext uri="{FF2B5EF4-FFF2-40B4-BE49-F238E27FC236}">
@@ -8078,7 +9528,7 @@
 </p:sld>
 </file>
 
-<file path=ppt/slides/slide4.xml><?xml version="1.0" encoding="utf-8"?>
+<file path=ppt/slides/slide5.xml><?xml version="1.0" encoding="utf-8"?>
 <p:sld xmlns:a="http://schemas.openxmlformats.org/drawingml/2006/main" xmlns:r="http://schemas.openxmlformats.org/officeDocument/2006/relationships" xmlns:p="http://schemas.openxmlformats.org/presentationml/2006/main">
   <p:cSld>
     <p:spTree>
@@ -9527,7 +10977,7 @@
 </p:sld>
 </file>
 
-<file path=ppt/slides/slide5.xml><?xml version="1.0" encoding="utf-8"?>
+<file path=ppt/slides/slide6.xml><?xml version="1.0" encoding="utf-8"?>
 <p:sld xmlns:a="http://schemas.openxmlformats.org/drawingml/2006/main" xmlns:r="http://schemas.openxmlformats.org/officeDocument/2006/relationships" xmlns:p="http://schemas.openxmlformats.org/presentationml/2006/main">
   <p:cSld>
     <p:spTree>
@@ -10585,7 +12035,7 @@
 </p:sld>
 </file>
 
-<file path=ppt/slides/slide6.xml><?xml version="1.0" encoding="utf-8"?>
+<file path=ppt/slides/slide7.xml><?xml version="1.0" encoding="utf-8"?>
 <p:sld xmlns:a="http://schemas.openxmlformats.org/drawingml/2006/main" xmlns:r="http://schemas.openxmlformats.org/officeDocument/2006/relationships" xmlns:p="http://schemas.openxmlformats.org/presentationml/2006/main">
   <p:cSld>
     <p:spTree>

</xml_diff>